<commit_message>
More styling for Home component
</commit_message>
<xml_diff>
--- a/docs/arrow.pptx
+++ b/docs/arrow.pptx
@@ -3133,7 +3133,7 @@
           <a:prstGeom prst="line">
             <a:avLst/>
           </a:prstGeom>
-          <a:ln w="38100">
+          <a:ln w="41275">
             <a:solidFill>
               <a:schemeClr val="bg1"/>
             </a:solidFill>
@@ -3163,13 +3163,13 @@
         </p:nvCxnSpPr>
         <p:spPr>
           <a:xfrm flipH="1">
-            <a:off x="4646429" y="903767"/>
+            <a:off x="4641113" y="903767"/>
             <a:ext cx="999461" cy="563526"/>
           </a:xfrm>
           <a:prstGeom prst="line">
             <a:avLst/>
           </a:prstGeom>
-          <a:ln w="38100">
+          <a:ln w="41275">
             <a:solidFill>
               <a:schemeClr val="bg1"/>
             </a:solidFill>

</xml_diff>